<commit_message>
Added Product Sans as Title font
</commit_message>
<xml_diff>
--- a/slide-master/CoolCodeConsortiumMaster.pptx
+++ b/slide-master/CoolCodeConsortiumMaster.pptx
@@ -109,6 +109,11 @@
       </a:defRPr>
     </a:lvl9pPr>
   </p:defaultTextStyle>
+  <p:extLst>
+    <p:ext uri="{EFAFB233-063F-42B5-8137-9DF3F51BA10A}">
+      <p15:sldGuideLst xmlns:p15="http://schemas.microsoft.com/office/powerpoint/2012/main"/>
+    </p:ext>
+  </p:extLst>
 </p:presentation>
 </file>
 
@@ -2047,7 +2052,7 @@
           <a:solidFill>
             <a:schemeClr val="bg1"/>
           </a:solidFill>
-          <a:latin typeface="Helvetica Neue Medium" panose="02000503000000020004" pitchFamily="2" charset="0"/>
+          <a:latin typeface="Product Sans" panose="020B0403030502040203" pitchFamily="34" charset="0"/>
           <a:ea typeface="Helvetica Neue Medium" panose="02000503000000020004" pitchFamily="2" charset="0"/>
           <a:cs typeface="Helvetica Neue Medium" panose="02000503000000020004" pitchFamily="2" charset="0"/>
         </a:defRPr>

</xml_diff>

<commit_message>
Changed title slides to have left-aligned text
</commit_message>
<xml_diff>
--- a/slide-master/CoolCodeConsortiumMaster.pptx
+++ b/slide-master/CoolCodeConsortiumMaster.pptx
@@ -175,7 +175,7 @@
             <a:normAutofit/>
           </a:bodyPr>
           <a:lstStyle>
-            <a:lvl1pPr algn="ctr">
+            <a:lvl1pPr algn="l">
               <a:defRPr sz="5400"/>
             </a:lvl1pPr>
           </a:lstStyle>
@@ -212,7 +212,7 @@
         <p:txBody>
           <a:bodyPr/>
           <a:lstStyle>
-            <a:lvl1pPr marL="0" indent="0" algn="ctr">
+            <a:lvl1pPr marL="0" indent="0" algn="l">
               <a:buNone/>
               <a:defRPr sz="2400">
                 <a:solidFill>
@@ -417,7 +417,7 @@
             <a:normAutofit/>
           </a:bodyPr>
           <a:lstStyle>
-            <a:lvl1pPr algn="ctr">
+            <a:lvl1pPr algn="l">
               <a:defRPr sz="5400">
                 <a:solidFill>
                   <a:schemeClr val="tx1">
@@ -461,7 +461,7 @@
         <p:txBody>
           <a:bodyPr/>
           <a:lstStyle>
-            <a:lvl1pPr marL="0" indent="0" algn="ctr">
+            <a:lvl1pPr marL="0" indent="0" algn="l">
               <a:buNone/>
               <a:defRPr sz="2400">
                 <a:solidFill>

</xml_diff>